<commit_message>
fix the git error and update the paper v1.5
</commit_message>
<xml_diff>
--- a/dbs/数据存储模型.pptx
+++ b/dbs/数据存储模型.pptx
@@ -296,7 +296,7 @@
           <a:p>
             <a:fld id="{530820CF-B880-4189-942D-D702A7CBA730}" type="datetimeFigureOut">
               <a:rPr lang="zh-CN" altLang="en-US" smtClean="0"/>
-              <a:t>2018/5/6</a:t>
+              <a:t>2018/5/22</a:t>
             </a:fld>
             <a:endParaRPr lang="zh-CN" altLang="en-US"/>
           </a:p>
@@ -461,7 +461,7 @@
           <a:p>
             <a:fld id="{530820CF-B880-4189-942D-D702A7CBA730}" type="datetimeFigureOut">
               <a:rPr lang="zh-CN" altLang="en-US" smtClean="0"/>
-              <a:t>2018/5/6</a:t>
+              <a:t>2018/5/22</a:t>
             </a:fld>
             <a:endParaRPr lang="zh-CN" altLang="en-US"/>
           </a:p>
@@ -636,7 +636,7 @@
           <a:p>
             <a:fld id="{530820CF-B880-4189-942D-D702A7CBA730}" type="datetimeFigureOut">
               <a:rPr lang="zh-CN" altLang="en-US" smtClean="0"/>
-              <a:t>2018/5/6</a:t>
+              <a:t>2018/5/22</a:t>
             </a:fld>
             <a:endParaRPr lang="zh-CN" altLang="en-US"/>
           </a:p>
@@ -801,7 +801,7 @@
           <a:p>
             <a:fld id="{530820CF-B880-4189-942D-D702A7CBA730}" type="datetimeFigureOut">
               <a:rPr lang="zh-CN" altLang="en-US" smtClean="0"/>
-              <a:t>2018/5/6</a:t>
+              <a:t>2018/5/22</a:t>
             </a:fld>
             <a:endParaRPr lang="zh-CN" altLang="en-US"/>
           </a:p>
@@ -1042,7 +1042,7 @@
           <a:p>
             <a:fld id="{530820CF-B880-4189-942D-D702A7CBA730}" type="datetimeFigureOut">
               <a:rPr lang="zh-CN" altLang="en-US" smtClean="0"/>
-              <a:t>2018/5/6</a:t>
+              <a:t>2018/5/22</a:t>
             </a:fld>
             <a:endParaRPr lang="zh-CN" altLang="en-US"/>
           </a:p>
@@ -1325,7 +1325,7 @@
           <a:p>
             <a:fld id="{530820CF-B880-4189-942D-D702A7CBA730}" type="datetimeFigureOut">
               <a:rPr lang="zh-CN" altLang="en-US" smtClean="0"/>
-              <a:t>2018/5/6</a:t>
+              <a:t>2018/5/22</a:t>
             </a:fld>
             <a:endParaRPr lang="zh-CN" altLang="en-US"/>
           </a:p>
@@ -1742,7 +1742,7 @@
           <a:p>
             <a:fld id="{530820CF-B880-4189-942D-D702A7CBA730}" type="datetimeFigureOut">
               <a:rPr lang="zh-CN" altLang="en-US" smtClean="0"/>
-              <a:t>2018/5/6</a:t>
+              <a:t>2018/5/22</a:t>
             </a:fld>
             <a:endParaRPr lang="zh-CN" altLang="en-US"/>
           </a:p>
@@ -1855,7 +1855,7 @@
           <a:p>
             <a:fld id="{530820CF-B880-4189-942D-D702A7CBA730}" type="datetimeFigureOut">
               <a:rPr lang="zh-CN" altLang="en-US" smtClean="0"/>
-              <a:t>2018/5/6</a:t>
+              <a:t>2018/5/22</a:t>
             </a:fld>
             <a:endParaRPr lang="zh-CN" altLang="en-US"/>
           </a:p>
@@ -1945,7 +1945,7 @@
           <a:p>
             <a:fld id="{530820CF-B880-4189-942D-D702A7CBA730}" type="datetimeFigureOut">
               <a:rPr lang="zh-CN" altLang="en-US" smtClean="0"/>
-              <a:t>2018/5/6</a:t>
+              <a:t>2018/5/22</a:t>
             </a:fld>
             <a:endParaRPr lang="zh-CN" altLang="en-US"/>
           </a:p>
@@ -2217,7 +2217,7 @@
           <a:p>
             <a:fld id="{530820CF-B880-4189-942D-D702A7CBA730}" type="datetimeFigureOut">
               <a:rPr lang="zh-CN" altLang="en-US" smtClean="0"/>
-              <a:t>2018/5/6</a:t>
+              <a:t>2018/5/22</a:t>
             </a:fld>
             <a:endParaRPr lang="zh-CN" altLang="en-US"/>
           </a:p>
@@ -2465,7 +2465,7 @@
           <a:p>
             <a:fld id="{530820CF-B880-4189-942D-D702A7CBA730}" type="datetimeFigureOut">
               <a:rPr lang="zh-CN" altLang="en-US" smtClean="0"/>
-              <a:t>2018/5/6</a:t>
+              <a:t>2018/5/22</a:t>
             </a:fld>
             <a:endParaRPr lang="zh-CN" altLang="en-US"/>
           </a:p>
@@ -2673,7 +2673,7 @@
           <a:p>
             <a:fld id="{530820CF-B880-4189-942D-D702A7CBA730}" type="datetimeFigureOut">
               <a:rPr lang="zh-CN" altLang="en-US" smtClean="0"/>
-              <a:t>2018/5/6</a:t>
+              <a:t>2018/5/22</a:t>
             </a:fld>
             <a:endParaRPr lang="zh-CN" altLang="en-US"/>
           </a:p>
@@ -6712,6 +6712,881 @@
           <a:chExt cx="0" cy="0"/>
         </a:xfrm>
       </p:grpSpPr>
+      <p:sp>
+        <p:nvSpPr>
+          <p:cNvPr id="2" name="椭圆 1"/>
+          <p:cNvSpPr/>
+          <p:nvPr/>
+        </p:nvSpPr>
+        <p:spPr>
+          <a:xfrm>
+            <a:off x="1691680" y="1501329"/>
+            <a:ext cx="936104" cy="936104"/>
+          </a:xfrm>
+          <a:prstGeom prst="ellipse">
+            <a:avLst/>
+          </a:prstGeom>
+          <a:solidFill>
+            <a:schemeClr val="accent1">
+              <a:lumMod val="20000"/>
+              <a:lumOff val="80000"/>
+            </a:schemeClr>
+          </a:solidFill>
+          <a:ln>
+            <a:noFill/>
+          </a:ln>
+        </p:spPr>
+        <p:style>
+          <a:lnRef idx="2">
+            <a:schemeClr val="accent1">
+              <a:shade val="50000"/>
+            </a:schemeClr>
+          </a:lnRef>
+          <a:fillRef idx="1">
+            <a:schemeClr val="accent1"/>
+          </a:fillRef>
+          <a:effectRef idx="0">
+            <a:schemeClr val="accent1"/>
+          </a:effectRef>
+          <a:fontRef idx="minor">
+            <a:schemeClr val="lt1"/>
+          </a:fontRef>
+        </p:style>
+        <p:txBody>
+          <a:bodyPr rtlCol="0" anchor="ctr"/>
+          <a:lstStyle/>
+          <a:p>
+            <a:pPr algn="ctr"/>
+            <a:r>
+              <a:rPr lang="zh-CN" altLang="en-US" sz="1200" dirty="0" smtClean="0"/>
+              <a:t>麻辣牛肉面</a:t>
+            </a:r>
+            <a:endParaRPr lang="zh-CN" altLang="en-US" sz="1200" dirty="0"/>
+          </a:p>
+        </p:txBody>
+      </p:sp>
+      <p:sp>
+        <p:nvSpPr>
+          <p:cNvPr id="3" name="椭圆 2"/>
+          <p:cNvSpPr/>
+          <p:nvPr/>
+        </p:nvSpPr>
+        <p:spPr>
+          <a:xfrm>
+            <a:off x="2665240" y="1075853"/>
+            <a:ext cx="936104" cy="936104"/>
+          </a:xfrm>
+          <a:prstGeom prst="ellipse">
+            <a:avLst/>
+          </a:prstGeom>
+          <a:solidFill>
+            <a:schemeClr val="accent1">
+              <a:lumMod val="20000"/>
+              <a:lumOff val="80000"/>
+            </a:schemeClr>
+          </a:solidFill>
+          <a:ln>
+            <a:noFill/>
+          </a:ln>
+        </p:spPr>
+        <p:style>
+          <a:lnRef idx="2">
+            <a:schemeClr val="accent1">
+              <a:shade val="50000"/>
+            </a:schemeClr>
+          </a:lnRef>
+          <a:fillRef idx="1">
+            <a:schemeClr val="accent1"/>
+          </a:fillRef>
+          <a:effectRef idx="0">
+            <a:schemeClr val="accent1"/>
+          </a:effectRef>
+          <a:fontRef idx="minor">
+            <a:schemeClr val="lt1"/>
+          </a:fontRef>
+        </p:style>
+        <p:txBody>
+          <a:bodyPr rtlCol="0" anchor="ctr"/>
+          <a:lstStyle/>
+          <a:p>
+            <a:pPr algn="ctr"/>
+            <a:r>
+              <a:rPr lang="zh-CN" altLang="en-US" sz="1200" dirty="0" smtClean="0"/>
+              <a:t>麻辣羊肉面</a:t>
+            </a:r>
+            <a:endParaRPr lang="zh-CN" altLang="en-US" sz="1200" dirty="0"/>
+          </a:p>
+        </p:txBody>
+      </p:sp>
+      <p:sp>
+        <p:nvSpPr>
+          <p:cNvPr id="4" name="椭圆 3"/>
+          <p:cNvSpPr/>
+          <p:nvPr/>
+        </p:nvSpPr>
+        <p:spPr>
+          <a:xfrm>
+            <a:off x="3672102" y="1196752"/>
+            <a:ext cx="936104" cy="936104"/>
+          </a:xfrm>
+          <a:prstGeom prst="ellipse">
+            <a:avLst/>
+          </a:prstGeom>
+          <a:solidFill>
+            <a:schemeClr val="accent1">
+              <a:lumMod val="20000"/>
+              <a:lumOff val="80000"/>
+            </a:schemeClr>
+          </a:solidFill>
+          <a:ln>
+            <a:noFill/>
+          </a:ln>
+        </p:spPr>
+        <p:style>
+          <a:lnRef idx="2">
+            <a:schemeClr val="accent1">
+              <a:shade val="50000"/>
+            </a:schemeClr>
+          </a:lnRef>
+          <a:fillRef idx="1">
+            <a:schemeClr val="accent1"/>
+          </a:fillRef>
+          <a:effectRef idx="0">
+            <a:schemeClr val="accent1"/>
+          </a:effectRef>
+          <a:fontRef idx="minor">
+            <a:schemeClr val="lt1"/>
+          </a:fontRef>
+        </p:style>
+        <p:txBody>
+          <a:bodyPr rtlCol="0" anchor="ctr"/>
+          <a:lstStyle/>
+          <a:p>
+            <a:pPr algn="ctr"/>
+            <a:r>
+              <a:rPr lang="zh-CN" altLang="en-US" sz="1200" dirty="0" smtClean="0"/>
+              <a:t>麻辣虾肉面</a:t>
+            </a:r>
+            <a:endParaRPr lang="zh-CN" altLang="en-US" sz="1200" dirty="0"/>
+          </a:p>
+        </p:txBody>
+      </p:sp>
+      <p:sp>
+        <p:nvSpPr>
+          <p:cNvPr id="5" name="椭圆 4"/>
+          <p:cNvSpPr/>
+          <p:nvPr/>
+        </p:nvSpPr>
+        <p:spPr>
+          <a:xfrm>
+            <a:off x="4608206" y="1593565"/>
+            <a:ext cx="936104" cy="936104"/>
+          </a:xfrm>
+          <a:prstGeom prst="ellipse">
+            <a:avLst/>
+          </a:prstGeom>
+          <a:solidFill>
+            <a:schemeClr val="accent1">
+              <a:lumMod val="20000"/>
+              <a:lumOff val="80000"/>
+            </a:schemeClr>
+          </a:solidFill>
+          <a:ln>
+            <a:noFill/>
+          </a:ln>
+        </p:spPr>
+        <p:style>
+          <a:lnRef idx="2">
+            <a:schemeClr val="accent1">
+              <a:shade val="50000"/>
+            </a:schemeClr>
+          </a:lnRef>
+          <a:fillRef idx="1">
+            <a:schemeClr val="accent1"/>
+          </a:fillRef>
+          <a:effectRef idx="0">
+            <a:schemeClr val="accent1"/>
+          </a:effectRef>
+          <a:fontRef idx="minor">
+            <a:schemeClr val="lt1"/>
+          </a:fontRef>
+        </p:style>
+        <p:txBody>
+          <a:bodyPr rtlCol="0" anchor="ctr"/>
+          <a:lstStyle/>
+          <a:p>
+            <a:pPr algn="ctr"/>
+            <a:r>
+              <a:rPr lang="zh-CN" altLang="en-US" sz="1200" dirty="0" smtClean="0"/>
+              <a:t>西红柿牛腩面</a:t>
+            </a:r>
+            <a:endParaRPr lang="zh-CN" altLang="en-US" sz="1200" dirty="0"/>
+          </a:p>
+        </p:txBody>
+      </p:sp>
+      <p:sp>
+        <p:nvSpPr>
+          <p:cNvPr id="6" name="椭圆 5"/>
+          <p:cNvSpPr/>
+          <p:nvPr/>
+        </p:nvSpPr>
+        <p:spPr>
+          <a:xfrm>
+            <a:off x="1547664" y="2797865"/>
+            <a:ext cx="720080" cy="684076"/>
+          </a:xfrm>
+          <a:prstGeom prst="ellipse">
+            <a:avLst/>
+          </a:prstGeom>
+          <a:solidFill>
+            <a:schemeClr val="accent2">
+              <a:lumMod val="20000"/>
+              <a:lumOff val="80000"/>
+            </a:schemeClr>
+          </a:solidFill>
+          <a:ln>
+            <a:noFill/>
+          </a:ln>
+        </p:spPr>
+        <p:style>
+          <a:lnRef idx="2">
+            <a:schemeClr val="accent1">
+              <a:shade val="50000"/>
+            </a:schemeClr>
+          </a:lnRef>
+          <a:fillRef idx="1">
+            <a:schemeClr val="accent1"/>
+          </a:fillRef>
+          <a:effectRef idx="0">
+            <a:schemeClr val="accent1"/>
+          </a:effectRef>
+          <a:fontRef idx="minor">
+            <a:schemeClr val="lt1"/>
+          </a:fontRef>
+        </p:style>
+        <p:txBody>
+          <a:bodyPr rtlCol="0" anchor="ctr"/>
+          <a:lstStyle/>
+          <a:p>
+            <a:pPr algn="ctr"/>
+            <a:r>
+              <a:rPr lang="zh-CN" altLang="en-US" sz="1100" dirty="0" smtClean="0"/>
+              <a:t>用户</a:t>
+            </a:r>
+            <a:r>
+              <a:rPr lang="en-US" altLang="zh-CN" sz="1100" dirty="0"/>
+              <a:t>1</a:t>
+            </a:r>
+            <a:endParaRPr lang="zh-CN" altLang="en-US" sz="1100" dirty="0"/>
+          </a:p>
+        </p:txBody>
+      </p:sp>
+      <p:sp>
+        <p:nvSpPr>
+          <p:cNvPr id="7" name="椭圆 6"/>
+          <p:cNvSpPr/>
+          <p:nvPr/>
+        </p:nvSpPr>
+        <p:spPr>
+          <a:xfrm>
+            <a:off x="2332232" y="3086164"/>
+            <a:ext cx="720080" cy="684076"/>
+          </a:xfrm>
+          <a:prstGeom prst="ellipse">
+            <a:avLst/>
+          </a:prstGeom>
+          <a:solidFill>
+            <a:schemeClr val="accent2">
+              <a:lumMod val="20000"/>
+              <a:lumOff val="80000"/>
+            </a:schemeClr>
+          </a:solidFill>
+          <a:ln>
+            <a:noFill/>
+          </a:ln>
+        </p:spPr>
+        <p:style>
+          <a:lnRef idx="2">
+            <a:schemeClr val="accent1">
+              <a:shade val="50000"/>
+            </a:schemeClr>
+          </a:lnRef>
+          <a:fillRef idx="1">
+            <a:schemeClr val="accent1"/>
+          </a:fillRef>
+          <a:effectRef idx="0">
+            <a:schemeClr val="accent1"/>
+          </a:effectRef>
+          <a:fontRef idx="minor">
+            <a:schemeClr val="lt1"/>
+          </a:fontRef>
+        </p:style>
+        <p:txBody>
+          <a:bodyPr rtlCol="0" anchor="ctr"/>
+          <a:lstStyle/>
+          <a:p>
+            <a:pPr algn="ctr"/>
+            <a:r>
+              <a:rPr lang="zh-CN" altLang="en-US" sz="1100" dirty="0" smtClean="0"/>
+              <a:t>用户</a:t>
+            </a:r>
+            <a:r>
+              <a:rPr lang="en-US" altLang="zh-CN" sz="1100" dirty="0" smtClean="0"/>
+              <a:t>2</a:t>
+            </a:r>
+            <a:endParaRPr lang="zh-CN" altLang="en-US" sz="1100" dirty="0"/>
+          </a:p>
+        </p:txBody>
+      </p:sp>
+      <p:sp>
+        <p:nvSpPr>
+          <p:cNvPr id="8" name="椭圆 7"/>
+          <p:cNvSpPr/>
+          <p:nvPr/>
+        </p:nvSpPr>
+        <p:spPr>
+          <a:xfrm>
+            <a:off x="3168249" y="3138531"/>
+            <a:ext cx="720080" cy="684076"/>
+          </a:xfrm>
+          <a:prstGeom prst="ellipse">
+            <a:avLst/>
+          </a:prstGeom>
+          <a:solidFill>
+            <a:schemeClr val="accent2">
+              <a:lumMod val="20000"/>
+              <a:lumOff val="80000"/>
+            </a:schemeClr>
+          </a:solidFill>
+          <a:ln>
+            <a:noFill/>
+          </a:ln>
+        </p:spPr>
+        <p:style>
+          <a:lnRef idx="2">
+            <a:schemeClr val="accent1">
+              <a:shade val="50000"/>
+            </a:schemeClr>
+          </a:lnRef>
+          <a:fillRef idx="1">
+            <a:schemeClr val="accent1"/>
+          </a:fillRef>
+          <a:effectRef idx="0">
+            <a:schemeClr val="accent1"/>
+          </a:effectRef>
+          <a:fontRef idx="minor">
+            <a:schemeClr val="lt1"/>
+          </a:fontRef>
+        </p:style>
+        <p:txBody>
+          <a:bodyPr rtlCol="0" anchor="ctr"/>
+          <a:lstStyle/>
+          <a:p>
+            <a:pPr algn="ctr"/>
+            <a:r>
+              <a:rPr lang="zh-CN" altLang="en-US" sz="1100" dirty="0" smtClean="0"/>
+              <a:t>用户</a:t>
+            </a:r>
+            <a:r>
+              <a:rPr lang="en-US" altLang="zh-CN" sz="1100" dirty="0" smtClean="0"/>
+              <a:t>3</a:t>
+            </a:r>
+            <a:endParaRPr lang="zh-CN" altLang="en-US" sz="1100" dirty="0"/>
+          </a:p>
+        </p:txBody>
+      </p:sp>
+      <p:sp>
+        <p:nvSpPr>
+          <p:cNvPr id="9" name="椭圆 8"/>
+          <p:cNvSpPr/>
+          <p:nvPr/>
+        </p:nvSpPr>
+        <p:spPr>
+          <a:xfrm>
+            <a:off x="4026165" y="3138531"/>
+            <a:ext cx="720080" cy="684076"/>
+          </a:xfrm>
+          <a:prstGeom prst="ellipse">
+            <a:avLst/>
+          </a:prstGeom>
+          <a:solidFill>
+            <a:schemeClr val="accent2">
+              <a:lumMod val="20000"/>
+              <a:lumOff val="80000"/>
+            </a:schemeClr>
+          </a:solidFill>
+          <a:ln>
+            <a:noFill/>
+          </a:ln>
+        </p:spPr>
+        <p:style>
+          <a:lnRef idx="2">
+            <a:schemeClr val="accent1">
+              <a:shade val="50000"/>
+            </a:schemeClr>
+          </a:lnRef>
+          <a:fillRef idx="1">
+            <a:schemeClr val="accent1"/>
+          </a:fillRef>
+          <a:effectRef idx="0">
+            <a:schemeClr val="accent1"/>
+          </a:effectRef>
+          <a:fontRef idx="minor">
+            <a:schemeClr val="lt1"/>
+          </a:fontRef>
+        </p:style>
+        <p:txBody>
+          <a:bodyPr rtlCol="0" anchor="ctr"/>
+          <a:lstStyle/>
+          <a:p>
+            <a:pPr algn="ctr"/>
+            <a:r>
+              <a:rPr lang="zh-CN" altLang="en-US" sz="1100" dirty="0" smtClean="0"/>
+              <a:t>用户</a:t>
+            </a:r>
+            <a:r>
+              <a:rPr lang="en-US" altLang="zh-CN" sz="1100" dirty="0" smtClean="0"/>
+              <a:t>4</a:t>
+            </a:r>
+            <a:endParaRPr lang="zh-CN" altLang="en-US" sz="1100" dirty="0"/>
+          </a:p>
+        </p:txBody>
+      </p:sp>
+      <p:sp>
+        <p:nvSpPr>
+          <p:cNvPr id="10" name="椭圆 9"/>
+          <p:cNvSpPr/>
+          <p:nvPr/>
+        </p:nvSpPr>
+        <p:spPr>
+          <a:xfrm>
+            <a:off x="4746245" y="2926483"/>
+            <a:ext cx="720080" cy="684076"/>
+          </a:xfrm>
+          <a:prstGeom prst="ellipse">
+            <a:avLst/>
+          </a:prstGeom>
+          <a:solidFill>
+            <a:schemeClr val="accent2">
+              <a:lumMod val="20000"/>
+              <a:lumOff val="80000"/>
+            </a:schemeClr>
+          </a:solidFill>
+          <a:ln>
+            <a:noFill/>
+          </a:ln>
+        </p:spPr>
+        <p:style>
+          <a:lnRef idx="2">
+            <a:schemeClr val="accent1">
+              <a:shade val="50000"/>
+            </a:schemeClr>
+          </a:lnRef>
+          <a:fillRef idx="1">
+            <a:schemeClr val="accent1"/>
+          </a:fillRef>
+          <a:effectRef idx="0">
+            <a:schemeClr val="accent1"/>
+          </a:effectRef>
+          <a:fontRef idx="minor">
+            <a:schemeClr val="lt1"/>
+          </a:fontRef>
+        </p:style>
+        <p:txBody>
+          <a:bodyPr rtlCol="0" anchor="ctr"/>
+          <a:lstStyle/>
+          <a:p>
+            <a:pPr algn="ctr"/>
+            <a:r>
+              <a:rPr lang="zh-CN" altLang="en-US" sz="1100" dirty="0" smtClean="0"/>
+              <a:t>用户</a:t>
+            </a:r>
+            <a:r>
+              <a:rPr lang="en-US" altLang="zh-CN" sz="1100" dirty="0" smtClean="0"/>
+              <a:t>5</a:t>
+            </a:r>
+            <a:endParaRPr lang="zh-CN" altLang="en-US" sz="1100" dirty="0"/>
+          </a:p>
+        </p:txBody>
+      </p:sp>
+      <p:cxnSp>
+        <p:nvCxnSpPr>
+          <p:cNvPr id="20" name="直接箭头连接符 19"/>
+          <p:cNvCxnSpPr>
+            <a:stCxn id="2" idx="4"/>
+            <a:endCxn id="6" idx="0"/>
+          </p:cNvCxnSpPr>
+          <p:nvPr/>
+        </p:nvCxnSpPr>
+        <p:spPr>
+          <a:xfrm flipH="1">
+            <a:off x="1907704" y="2437433"/>
+            <a:ext cx="252028" cy="360432"/>
+          </a:xfrm>
+          <a:prstGeom prst="straightConnector1">
+            <a:avLst/>
+          </a:prstGeom>
+          <a:ln>
+            <a:tailEnd type="arrow"/>
+          </a:ln>
+        </p:spPr>
+        <p:style>
+          <a:lnRef idx="1">
+            <a:schemeClr val="accent1"/>
+          </a:lnRef>
+          <a:fillRef idx="0">
+            <a:schemeClr val="accent1"/>
+          </a:fillRef>
+          <a:effectRef idx="0">
+            <a:schemeClr val="accent1"/>
+          </a:effectRef>
+          <a:fontRef idx="minor">
+            <a:schemeClr val="tx1"/>
+          </a:fontRef>
+        </p:style>
+      </p:cxnSp>
+      <p:cxnSp>
+        <p:nvCxnSpPr>
+          <p:cNvPr id="22" name="直接箭头连接符 21"/>
+          <p:cNvCxnSpPr>
+            <a:stCxn id="2" idx="4"/>
+            <a:endCxn id="7" idx="0"/>
+          </p:cNvCxnSpPr>
+          <p:nvPr/>
+        </p:nvCxnSpPr>
+        <p:spPr>
+          <a:xfrm>
+            <a:off x="2159732" y="2437433"/>
+            <a:ext cx="532540" cy="648731"/>
+          </a:xfrm>
+          <a:prstGeom prst="straightConnector1">
+            <a:avLst/>
+          </a:prstGeom>
+          <a:ln>
+            <a:tailEnd type="arrow"/>
+          </a:ln>
+        </p:spPr>
+        <p:style>
+          <a:lnRef idx="1">
+            <a:schemeClr val="accent1"/>
+          </a:lnRef>
+          <a:fillRef idx="0">
+            <a:schemeClr val="accent1"/>
+          </a:fillRef>
+          <a:effectRef idx="0">
+            <a:schemeClr val="accent1"/>
+          </a:effectRef>
+          <a:fontRef idx="minor">
+            <a:schemeClr val="tx1"/>
+          </a:fontRef>
+        </p:style>
+      </p:cxnSp>
+      <p:cxnSp>
+        <p:nvCxnSpPr>
+          <p:cNvPr id="24" name="直接箭头连接符 23"/>
+          <p:cNvCxnSpPr>
+            <a:stCxn id="2" idx="4"/>
+            <a:endCxn id="8" idx="0"/>
+          </p:cNvCxnSpPr>
+          <p:nvPr/>
+        </p:nvCxnSpPr>
+        <p:spPr>
+          <a:xfrm>
+            <a:off x="2159732" y="2437433"/>
+            <a:ext cx="1368557" cy="701098"/>
+          </a:xfrm>
+          <a:prstGeom prst="straightConnector1">
+            <a:avLst/>
+          </a:prstGeom>
+          <a:ln>
+            <a:tailEnd type="arrow"/>
+          </a:ln>
+        </p:spPr>
+        <p:style>
+          <a:lnRef idx="1">
+            <a:schemeClr val="accent1"/>
+          </a:lnRef>
+          <a:fillRef idx="0">
+            <a:schemeClr val="accent1"/>
+          </a:fillRef>
+          <a:effectRef idx="0">
+            <a:schemeClr val="accent1"/>
+          </a:effectRef>
+          <a:fontRef idx="minor">
+            <a:schemeClr val="tx1"/>
+          </a:fontRef>
+        </p:style>
+      </p:cxnSp>
+      <p:cxnSp>
+        <p:nvCxnSpPr>
+          <p:cNvPr id="26" name="直接箭头连接符 25"/>
+          <p:cNvCxnSpPr>
+            <a:stCxn id="2" idx="4"/>
+            <a:endCxn id="10" idx="0"/>
+          </p:cNvCxnSpPr>
+          <p:nvPr/>
+        </p:nvCxnSpPr>
+        <p:spPr>
+          <a:xfrm>
+            <a:off x="2159732" y="2437433"/>
+            <a:ext cx="2946553" cy="489050"/>
+          </a:xfrm>
+          <a:prstGeom prst="straightConnector1">
+            <a:avLst/>
+          </a:prstGeom>
+          <a:ln>
+            <a:tailEnd type="arrow"/>
+          </a:ln>
+        </p:spPr>
+        <p:style>
+          <a:lnRef idx="1">
+            <a:schemeClr val="accent1"/>
+          </a:lnRef>
+          <a:fillRef idx="0">
+            <a:schemeClr val="accent1"/>
+          </a:fillRef>
+          <a:effectRef idx="0">
+            <a:schemeClr val="accent1"/>
+          </a:effectRef>
+          <a:fontRef idx="minor">
+            <a:schemeClr val="tx1"/>
+          </a:fontRef>
+        </p:style>
+      </p:cxnSp>
+      <p:cxnSp>
+        <p:nvCxnSpPr>
+          <p:cNvPr id="28" name="直接箭头连接符 27"/>
+          <p:cNvCxnSpPr>
+            <a:stCxn id="3" idx="4"/>
+            <a:endCxn id="7" idx="0"/>
+          </p:cNvCxnSpPr>
+          <p:nvPr/>
+        </p:nvCxnSpPr>
+        <p:spPr>
+          <a:xfrm flipH="1">
+            <a:off x="2692272" y="2011957"/>
+            <a:ext cx="441020" cy="1074207"/>
+          </a:xfrm>
+          <a:prstGeom prst="straightConnector1">
+            <a:avLst/>
+          </a:prstGeom>
+          <a:ln>
+            <a:tailEnd type="arrow"/>
+          </a:ln>
+        </p:spPr>
+        <p:style>
+          <a:lnRef idx="1">
+            <a:schemeClr val="accent1"/>
+          </a:lnRef>
+          <a:fillRef idx="0">
+            <a:schemeClr val="accent1"/>
+          </a:fillRef>
+          <a:effectRef idx="0">
+            <a:schemeClr val="accent1"/>
+          </a:effectRef>
+          <a:fontRef idx="minor">
+            <a:schemeClr val="tx1"/>
+          </a:fontRef>
+        </p:style>
+      </p:cxnSp>
+      <p:cxnSp>
+        <p:nvCxnSpPr>
+          <p:cNvPr id="30" name="直接箭头连接符 29"/>
+          <p:cNvCxnSpPr>
+            <a:stCxn id="3" idx="4"/>
+            <a:endCxn id="8" idx="0"/>
+          </p:cNvCxnSpPr>
+          <p:nvPr/>
+        </p:nvCxnSpPr>
+        <p:spPr>
+          <a:xfrm>
+            <a:off x="3133292" y="2011957"/>
+            <a:ext cx="394997" cy="1126574"/>
+          </a:xfrm>
+          <a:prstGeom prst="straightConnector1">
+            <a:avLst/>
+          </a:prstGeom>
+          <a:ln>
+            <a:tailEnd type="arrow"/>
+          </a:ln>
+        </p:spPr>
+        <p:style>
+          <a:lnRef idx="1">
+            <a:schemeClr val="accent1"/>
+          </a:lnRef>
+          <a:fillRef idx="0">
+            <a:schemeClr val="accent1"/>
+          </a:fillRef>
+          <a:effectRef idx="0">
+            <a:schemeClr val="accent1"/>
+          </a:effectRef>
+          <a:fontRef idx="minor">
+            <a:schemeClr val="tx1"/>
+          </a:fontRef>
+        </p:style>
+      </p:cxnSp>
+      <p:cxnSp>
+        <p:nvCxnSpPr>
+          <p:cNvPr id="32" name="直接箭头连接符 31"/>
+          <p:cNvCxnSpPr>
+            <a:stCxn id="4" idx="4"/>
+            <a:endCxn id="10" idx="0"/>
+          </p:cNvCxnSpPr>
+          <p:nvPr/>
+        </p:nvCxnSpPr>
+        <p:spPr>
+          <a:xfrm>
+            <a:off x="4140154" y="2132856"/>
+            <a:ext cx="966131" cy="793627"/>
+          </a:xfrm>
+          <a:prstGeom prst="straightConnector1">
+            <a:avLst/>
+          </a:prstGeom>
+          <a:ln>
+            <a:tailEnd type="arrow"/>
+          </a:ln>
+        </p:spPr>
+        <p:style>
+          <a:lnRef idx="1">
+            <a:schemeClr val="accent1"/>
+          </a:lnRef>
+          <a:fillRef idx="0">
+            <a:schemeClr val="accent1"/>
+          </a:fillRef>
+          <a:effectRef idx="0">
+            <a:schemeClr val="accent1"/>
+          </a:effectRef>
+          <a:fontRef idx="minor">
+            <a:schemeClr val="tx1"/>
+          </a:fontRef>
+        </p:style>
+      </p:cxnSp>
+      <p:cxnSp>
+        <p:nvCxnSpPr>
+          <p:cNvPr id="34" name="直接箭头连接符 33"/>
+          <p:cNvCxnSpPr>
+            <a:stCxn id="5" idx="4"/>
+            <a:endCxn id="9" idx="0"/>
+          </p:cNvCxnSpPr>
+          <p:nvPr/>
+        </p:nvCxnSpPr>
+        <p:spPr>
+          <a:xfrm flipH="1">
+            <a:off x="4386205" y="2529669"/>
+            <a:ext cx="690053" cy="608862"/>
+          </a:xfrm>
+          <a:prstGeom prst="straightConnector1">
+            <a:avLst/>
+          </a:prstGeom>
+          <a:ln>
+            <a:solidFill>
+              <a:schemeClr val="accent3">
+                <a:lumMod val="60000"/>
+                <a:lumOff val="40000"/>
+              </a:schemeClr>
+            </a:solidFill>
+            <a:tailEnd type="arrow"/>
+          </a:ln>
+        </p:spPr>
+        <p:style>
+          <a:lnRef idx="1">
+            <a:schemeClr val="accent1"/>
+          </a:lnRef>
+          <a:fillRef idx="0">
+            <a:schemeClr val="accent1"/>
+          </a:fillRef>
+          <a:effectRef idx="0">
+            <a:schemeClr val="accent1"/>
+          </a:effectRef>
+          <a:fontRef idx="minor">
+            <a:schemeClr val="tx1"/>
+          </a:fontRef>
+        </p:style>
+      </p:cxnSp>
+      <p:cxnSp>
+        <p:nvCxnSpPr>
+          <p:cNvPr id="36" name="直接箭头连接符 35"/>
+          <p:cNvCxnSpPr>
+            <a:stCxn id="5" idx="4"/>
+            <a:endCxn id="10" idx="0"/>
+          </p:cNvCxnSpPr>
+          <p:nvPr/>
+        </p:nvCxnSpPr>
+        <p:spPr>
+          <a:xfrm>
+            <a:off x="5076258" y="2529669"/>
+            <a:ext cx="30027" cy="396814"/>
+          </a:xfrm>
+          <a:prstGeom prst="straightConnector1">
+            <a:avLst/>
+          </a:prstGeom>
+          <a:ln>
+            <a:solidFill>
+              <a:schemeClr val="accent3">
+                <a:lumMod val="60000"/>
+                <a:lumOff val="40000"/>
+              </a:schemeClr>
+            </a:solidFill>
+            <a:tailEnd type="arrow"/>
+          </a:ln>
+        </p:spPr>
+        <p:style>
+          <a:lnRef idx="1">
+            <a:schemeClr val="accent1"/>
+          </a:lnRef>
+          <a:fillRef idx="0">
+            <a:schemeClr val="accent1"/>
+          </a:fillRef>
+          <a:effectRef idx="0">
+            <a:schemeClr val="accent1"/>
+          </a:effectRef>
+          <a:fontRef idx="minor">
+            <a:schemeClr val="tx1"/>
+          </a:fontRef>
+        </p:style>
+      </p:cxnSp>
+      <p:cxnSp>
+        <p:nvCxnSpPr>
+          <p:cNvPr id="38" name="直接箭头连接符 37"/>
+          <p:cNvCxnSpPr>
+            <a:stCxn id="5" idx="4"/>
+            <a:endCxn id="8" idx="0"/>
+          </p:cNvCxnSpPr>
+          <p:nvPr/>
+        </p:nvCxnSpPr>
+        <p:spPr>
+          <a:xfrm flipH="1">
+            <a:off x="3528289" y="2529669"/>
+            <a:ext cx="1547969" cy="608862"/>
+          </a:xfrm>
+          <a:prstGeom prst="straightConnector1">
+            <a:avLst/>
+          </a:prstGeom>
+          <a:ln>
+            <a:solidFill>
+              <a:schemeClr val="accent3">
+                <a:lumMod val="60000"/>
+                <a:lumOff val="40000"/>
+              </a:schemeClr>
+            </a:solidFill>
+            <a:tailEnd type="arrow"/>
+          </a:ln>
+        </p:spPr>
+        <p:style>
+          <a:lnRef idx="1">
+            <a:schemeClr val="accent1"/>
+          </a:lnRef>
+          <a:fillRef idx="0">
+            <a:schemeClr val="accent1"/>
+          </a:fillRef>
+          <a:effectRef idx="0">
+            <a:schemeClr val="accent1"/>
+          </a:effectRef>
+          <a:fontRef idx="minor">
+            <a:schemeClr val="tx1"/>
+          </a:fontRef>
+        </p:style>
+      </p:cxnSp>
     </p:spTree>
     <p:extLst>
       <p:ext uri="{BB962C8B-B14F-4D97-AF65-F5344CB8AC3E}">

</xml_diff>